<commit_message>
Small PPT change - added date
sesije 01-07
</commit_message>
<xml_diff>
--- a/sesija-07/PPT/Front-End Developer-07.pptx
+++ b/sesija-07/PPT/Front-End Developer-07.pptx
@@ -8330,11 +8330,7 @@
           <a:p>
             <a:r>
               <a:rPr lang="en-US" smtClean="0"/>
-              <a:t>while </a:t>
-            </a:r>
-            <a:r>
-              <a:rPr lang="en-US" smtClean="0"/>
-              <a:t>loop</a:t>
+              <a:t>while loop</a:t>
             </a:r>
             <a:endParaRPr lang="sr-Latn-RS"/>
           </a:p>

</xml_diff>